<commit_message>
Angular generator fix v2.5.9
</commit_message>
<xml_diff>
--- a/resource/presentation/JavaOne SFO - 2016/JPAModeler JavaOne SFO - 2016 - CONF.pptx
+++ b/resource/presentation/JavaOne SFO - 2016/JPAModeler JavaOne SFO - 2016 - CONF.pptx
@@ -313,7 +313,7 @@
           <a:p>
             <a:fld id="{9B2569C3-B665-4FC2-A1C0-937A4220DCD2}" type="datetimeFigureOut">
               <a:rPr lang="en-GB" smtClean="0"/>
-              <a:t>08/09/2016</a:t>
+              <a:t>13/09/2016</a:t>
             </a:fld>
             <a:endParaRPr lang="en-GB"/>
           </a:p>
@@ -16344,9 +16344,9 @@
       </p:grpSpPr>
       <p:pic>
         <p:nvPicPr>
-          <p:cNvPr id="1038" name="Picture 14" descr="https://cwiki.apache.org/confluence/download/attachments/27832442/DeltaSpike?version=5&amp;modificationDate=1437755904000&amp;api=v2"/>
+          <p:cNvPr id="11" name="Picture 10"/>
           <p:cNvPicPr>
-            <a:picLocks noChangeAspect="1" noChangeArrowheads="1"/>
+            <a:picLocks noChangeAspect="1"/>
           </p:cNvPicPr>
           <p:nvPr/>
         </p:nvPicPr>
@@ -16358,29 +16358,18 @@
               </a:ext>
             </a:extLst>
           </a:blip>
-          <a:srcRect/>
           <a:stretch>
             <a:fillRect/>
           </a:stretch>
         </p:blipFill>
-        <p:spPr bwMode="auto">
+        <p:spPr>
           <a:xfrm>
-            <a:off x="5857281" y="3545513"/>
-            <a:ext cx="1954991" cy="1231913"/>
+            <a:off x="6516044" y="3746200"/>
+            <a:ext cx="993215" cy="933020"/>
           </a:xfrm>
           <a:prstGeom prst="rect">
             <a:avLst/>
           </a:prstGeom>
-          <a:noFill/>
-          <a:extLst>
-            <a:ext uri="{909E8E84-426E-40DD-AFC4-6F175D3DCCD1}">
-              <a14:hiddenFill xmlns:a14="http://schemas.microsoft.com/office/drawing/2010/main">
-                <a:solidFill>
-                  <a:srgbClr val="FFFFFF"/>
-                </a:solidFill>
-              </a14:hiddenFill>
-            </a:ext>
-          </a:extLst>
         </p:spPr>
       </p:pic>
       <p:sp>

</xml_diff>